<commit_message>
seq diagr slides title changed
</commit_message>
<xml_diff>
--- a/Presentation.pptx
+++ b/Presentation.pptx
@@ -184,7 +184,7 @@
     </p:ext>
     <p:ext uri="{EFAFB233-063F-42B5-8137-9DF3F51BA10A}">
       <p15:sldGuideLst xmlns:p15="http://schemas.microsoft.com/office/powerpoint/2012/main">
-        <p15:guide id="1" orient="horz" pos="2136" userDrawn="1">
+        <p15:guide id="1" orient="horz" pos="2112" userDrawn="1">
           <p15:clr>
             <a:srgbClr val="A4A3A4"/>
           </p15:clr>
@@ -1944,15 +1944,6 @@
           <a:p>
             <a:endParaRPr lang="ru-RU" baseline="0" dirty="0" smtClean="0"/>
           </a:p>
-          <a:p>
-            <a:r>
-              <a:rPr lang="ru-RU" b="1" baseline="0" dirty="0" smtClean="0"/>
-              <a:t>Почему я?</a:t>
-            </a:r>
-          </a:p>
-          <a:p>
-            <a:endParaRPr lang="uk-UA" dirty="0"/>
-          </a:p>
         </p:txBody>
       </p:sp>
       <p:sp>
@@ -3246,13 +3237,23 @@
           <a:p>
             <a:r>
               <a:rPr lang="ru-RU" dirty="0" smtClean="0"/>
-              <a:t>	</a:t>
-            </a:r>
-          </a:p>
-          <a:p>
+              <a:t>	Программа работает с Анализаторами спектра, которые позволяют проводить сканирование частотного диапазона в режиме реального времени. Используются устройства от разных</a:t>
+            </a:r>
+            <a:r>
+              <a:rPr lang="ru-RU" baseline="0" dirty="0" smtClean="0"/>
+              <a:t> производителей и поэтому каждое имеет свои особенности: работают </a:t>
+            </a:r>
             <a:r>
               <a:rPr lang="ru-RU" dirty="0" smtClean="0"/>
-              <a:t>	</a:t>
+              <a:t>в разных программных средах с различной частотой обновления, используют различные</a:t>
+            </a:r>
+            <a:r>
+              <a:rPr lang="ru-RU" baseline="0" dirty="0" smtClean="0"/>
+              <a:t> интерфейсы для передачи данных</a:t>
+            </a:r>
+            <a:r>
+              <a:rPr lang="ru-RU" dirty="0" smtClean="0"/>
+              <a:t>.</a:t>
             </a:r>
             <a:endParaRPr lang="ru-RU" dirty="0"/>
           </a:p>
@@ -3807,11 +3808,19 @@
             </a:r>
             <a:r>
               <a:rPr lang="ru-RU" baseline="0" dirty="0" smtClean="0"/>
-              <a:t> поведение устройств в абстрактном классе </a:t>
+              <a:t> поведение устройств </a:t>
+            </a:r>
+            <a:r>
+              <a:rPr lang="ru-RU" baseline="0" dirty="0" smtClean="0"/>
+              <a:t>через абстрактный класс </a:t>
             </a:r>
             <a:r>
               <a:rPr lang="ru-RU" dirty="0" smtClean="0"/>
-              <a:t>Device. Используется</a:t>
+              <a:t>Device. </a:t>
+            </a:r>
+            <a:r>
+              <a:rPr lang="ru-RU" dirty="0" smtClean="0"/>
+              <a:t>Для создания экземпляра используется</a:t>
             </a:r>
             <a:r>
               <a:rPr lang="ru-RU" baseline="0" dirty="0" smtClean="0"/>
@@ -7903,7 +7912,7 @@
           <a:graphicData uri="http://schemas.openxmlformats.org/presentationml/2006/ole">
             <mc:AlternateContent xmlns:mc="http://schemas.openxmlformats.org/markup-compatibility/2006">
               <mc:Choice xmlns:v="urn:schemas-microsoft-com:vml" Requires="v">
-                <p:oleObj spid="_x0000_s4422" name="Visio" r:id="rId4" imgW="12039600" imgH="10124985" progId="Visio.Drawing.15">
+                <p:oleObj spid="_x0000_s4460" name="Visio" r:id="rId4" imgW="12039600" imgH="10124985" progId="Visio.Drawing.15">
                   <p:embed/>
                 </p:oleObj>
               </mc:Choice>
@@ -9852,17 +9861,23 @@
           <p:cNvGraphicFramePr>
             <a:graphicFrameLocks noChangeAspect="1"/>
           </p:cNvGraphicFramePr>
-          <p:nvPr/>
+          <p:nvPr>
+            <p:extLst>
+              <p:ext uri="{D42A27DB-BD31-4B8C-83A1-F6EECF244321}">
+                <p14:modId xmlns:p14="http://schemas.microsoft.com/office/powerpoint/2010/main" val="2497124163"/>
+              </p:ext>
+            </p:extLst>
+          </p:nvPr>
         </p:nvGraphicFramePr>
         <p:xfrm>
-          <a:off x="164592" y="1920240"/>
+          <a:off x="164592" y="1222925"/>
           <a:ext cx="11880061" cy="4636008"/>
         </p:xfrm>
         <a:graphic>
           <a:graphicData uri="http://schemas.openxmlformats.org/presentationml/2006/ole">
             <mc:AlternateContent xmlns:mc="http://schemas.openxmlformats.org/markup-compatibility/2006">
               <mc:Choice xmlns:v="urn:schemas-microsoft-com:vml" Requires="v">
-                <p:oleObj spid="_x0000_s16443" name="Visio" r:id="rId4" imgW="13496857" imgH="5267235" progId="Visio.Drawing.15">
+                <p:oleObj spid="_x0000_s16481" name="Visio" r:id="rId4" imgW="13496857" imgH="5267235" progId="Visio.Drawing.15">
                   <p:embed/>
                 </p:oleObj>
               </mc:Choice>
@@ -9883,7 +9898,7 @@
                     </p:blipFill>
                     <p:spPr>
                       <a:xfrm>
-                        <a:off x="164592" y="1920240"/>
+                        <a:off x="164592" y="1222925"/>
                         <a:ext cx="11880061" cy="4636008"/>
                       </a:xfrm>
                       <a:prstGeom prst="rect">
@@ -9897,30 +9912,6 @@
           </a:graphicData>
         </a:graphic>
       </p:graphicFrame>
-      <p:sp>
-        <p:nvSpPr>
-          <p:cNvPr id="4" name="Title 3"/>
-          <p:cNvSpPr>
-            <a:spLocks noGrp="1"/>
-          </p:cNvSpPr>
-          <p:nvPr>
-            <p:ph type="title"/>
-          </p:nvPr>
-        </p:nvSpPr>
-        <p:spPr/>
-        <p:txBody>
-          <a:bodyPr/>
-          <a:lstStyle/>
-          <a:p>
-            <a:pPr algn="ctr"/>
-            <a:r>
-              <a:rPr lang="uk-UA" dirty="0" smtClean="0"/>
-              <a:t>Схема роботи програми</a:t>
-            </a:r>
-            <a:endParaRPr lang="uk-UA" dirty="0"/>
-          </a:p>
-        </p:txBody>
-      </p:sp>
       <p:pic>
         <p:nvPicPr>
           <p:cNvPr id="6" name="Picture 5"/>
@@ -9943,7 +9934,7 @@
         </p:blipFill>
         <p:spPr>
           <a:xfrm>
-            <a:off x="-5680477" y="-168103"/>
+            <a:off x="-5680477" y="-865418"/>
             <a:ext cx="23622150" cy="8512636"/>
           </a:xfrm>
           <a:prstGeom prst="rect">
@@ -10013,20 +10004,20 @@
           <p:nvPr>
             <p:extLst>
               <p:ext uri="{D42A27DB-BD31-4B8C-83A1-F6EECF244321}">
-                <p14:modId xmlns:p14="http://schemas.microsoft.com/office/powerpoint/2010/main" val="2275590299"/>
+                <p14:modId xmlns:p14="http://schemas.microsoft.com/office/powerpoint/2010/main" val="1999681344"/>
               </p:ext>
             </p:extLst>
           </p:nvPr>
         </p:nvGraphicFramePr>
         <p:xfrm>
-          <a:off x="164592" y="1920240"/>
+          <a:off x="164592" y="1222924"/>
           <a:ext cx="11880061" cy="4636008"/>
         </p:xfrm>
         <a:graphic>
           <a:graphicData uri="http://schemas.openxmlformats.org/presentationml/2006/ole">
             <mc:AlternateContent xmlns:mc="http://schemas.openxmlformats.org/markup-compatibility/2006">
               <mc:Choice xmlns:v="urn:schemas-microsoft-com:vml" Requires="v">
-                <p:oleObj spid="_x0000_s9489" name="Visio" r:id="rId4" imgW="13496857" imgH="5267235" progId="Visio.Drawing.15">
+                <p:oleObj spid="_x0000_s9527" name="Visio" r:id="rId4" imgW="13496857" imgH="5267235" progId="Visio.Drawing.15">
                   <p:embed/>
                 </p:oleObj>
               </mc:Choice>
@@ -10047,7 +10038,7 @@
                     </p:blipFill>
                     <p:spPr>
                       <a:xfrm>
-                        <a:off x="164592" y="1920240"/>
+                        <a:off x="164592" y="1222924"/>
                         <a:ext cx="11880061" cy="4636008"/>
                       </a:xfrm>
                       <a:prstGeom prst="rect">
@@ -10061,30 +10052,6 @@
           </a:graphicData>
         </a:graphic>
       </p:graphicFrame>
-      <p:sp>
-        <p:nvSpPr>
-          <p:cNvPr id="4" name="Title 3"/>
-          <p:cNvSpPr>
-            <a:spLocks noGrp="1"/>
-          </p:cNvSpPr>
-          <p:nvPr>
-            <p:ph type="title"/>
-          </p:nvPr>
-        </p:nvSpPr>
-        <p:spPr/>
-        <p:txBody>
-          <a:bodyPr/>
-          <a:lstStyle/>
-          <a:p>
-            <a:pPr algn="ctr"/>
-            <a:r>
-              <a:rPr lang="uk-UA" dirty="0" smtClean="0"/>
-              <a:t>Схема роботи програми</a:t>
-            </a:r>
-            <a:endParaRPr lang="uk-UA" dirty="0"/>
-          </a:p>
-        </p:txBody>
-      </p:sp>
       <p:pic>
         <p:nvPicPr>
           <p:cNvPr id="6" name="Picture 5"/>
@@ -10107,7 +10074,7 @@
         </p:blipFill>
         <p:spPr>
           <a:xfrm>
-            <a:off x="-5781751" y="-168103"/>
+            <a:off x="-5781751" y="-865419"/>
             <a:ext cx="23622152" cy="8512637"/>
           </a:xfrm>
           <a:prstGeom prst="rect">
@@ -10168,20 +10135,20 @@
           <p:nvPr>
             <p:extLst>
               <p:ext uri="{D42A27DB-BD31-4B8C-83A1-F6EECF244321}">
-                <p14:modId xmlns:p14="http://schemas.microsoft.com/office/powerpoint/2010/main" val="3888636267"/>
+                <p14:modId xmlns:p14="http://schemas.microsoft.com/office/powerpoint/2010/main" val="371786961"/>
               </p:ext>
             </p:extLst>
           </p:nvPr>
         </p:nvGraphicFramePr>
         <p:xfrm>
-          <a:off x="164592" y="1920240"/>
+          <a:off x="164592" y="1222924"/>
           <a:ext cx="11880061" cy="4636008"/>
         </p:xfrm>
         <a:graphic>
           <a:graphicData uri="http://schemas.openxmlformats.org/presentationml/2006/ole">
             <mc:AlternateContent xmlns:mc="http://schemas.openxmlformats.org/markup-compatibility/2006">
               <mc:Choice xmlns:v="urn:schemas-microsoft-com:vml" Requires="v">
-                <p:oleObj spid="_x0000_s10513" name="Visio" r:id="rId4" imgW="13496857" imgH="5267235" progId="Visio.Drawing.15">
+                <p:oleObj spid="_x0000_s10551" name="Visio" r:id="rId4" imgW="13496857" imgH="5267235" progId="Visio.Drawing.15">
                   <p:embed/>
                 </p:oleObj>
               </mc:Choice>
@@ -10202,7 +10169,7 @@
                     </p:blipFill>
                     <p:spPr>
                       <a:xfrm>
-                        <a:off x="164592" y="1920240"/>
+                        <a:off x="164592" y="1222924"/>
                         <a:ext cx="11880061" cy="4636008"/>
                       </a:xfrm>
                       <a:prstGeom prst="rect">
@@ -10216,30 +10183,6 @@
           </a:graphicData>
         </a:graphic>
       </p:graphicFrame>
-      <p:sp>
-        <p:nvSpPr>
-          <p:cNvPr id="4" name="Title 3"/>
-          <p:cNvSpPr>
-            <a:spLocks noGrp="1"/>
-          </p:cNvSpPr>
-          <p:nvPr>
-            <p:ph type="title"/>
-          </p:nvPr>
-        </p:nvSpPr>
-        <p:spPr/>
-        <p:txBody>
-          <a:bodyPr/>
-          <a:lstStyle/>
-          <a:p>
-            <a:pPr algn="ctr"/>
-            <a:r>
-              <a:rPr lang="uk-UA" dirty="0" smtClean="0"/>
-              <a:t>Схема роботи програми</a:t>
-            </a:r>
-            <a:endParaRPr lang="uk-UA" dirty="0"/>
-          </a:p>
-        </p:txBody>
-      </p:sp>
       <p:pic>
         <p:nvPicPr>
           <p:cNvPr id="6" name="Picture 5"/>
@@ -10262,7 +10205,7 @@
         </p:blipFill>
         <p:spPr>
           <a:xfrm>
-            <a:off x="-5781750" y="-168103"/>
+            <a:off x="-5781750" y="-865419"/>
             <a:ext cx="23622150" cy="8512637"/>
           </a:xfrm>
           <a:prstGeom prst="rect">
@@ -10298,7 +10241,7 @@
 </file>
 
 <file path=ppt/slides/slide14.xml><?xml version="1.0" encoding="utf-8"?>
-<p:sld xmlns:a="http://schemas.openxmlformats.org/drawingml/2006/main" xmlns:r="http://schemas.openxmlformats.org/officeDocument/2006/relationships" xmlns:p="http://schemas.openxmlformats.org/presentationml/2006/main" show="0">
+<p:sld xmlns:a="http://schemas.openxmlformats.org/drawingml/2006/main" xmlns:r="http://schemas.openxmlformats.org/officeDocument/2006/relationships" xmlns:p="http://schemas.openxmlformats.org/presentationml/2006/main">
   <p:cSld>
     <p:spTree>
       <p:nvGrpSpPr>
@@ -10323,20 +10266,20 @@
           <p:nvPr>
             <p:extLst>
               <p:ext uri="{D42A27DB-BD31-4B8C-83A1-F6EECF244321}">
-                <p14:modId xmlns:p14="http://schemas.microsoft.com/office/powerpoint/2010/main" val="211684438"/>
+                <p14:modId xmlns:p14="http://schemas.microsoft.com/office/powerpoint/2010/main" val="3589204678"/>
               </p:ext>
             </p:extLst>
           </p:nvPr>
         </p:nvGraphicFramePr>
         <p:xfrm>
-          <a:off x="164592" y="1920240"/>
+          <a:off x="164592" y="1237213"/>
           <a:ext cx="11880061" cy="4636008"/>
         </p:xfrm>
         <a:graphic>
           <a:graphicData uri="http://schemas.openxmlformats.org/presentationml/2006/ole">
             <mc:AlternateContent xmlns:mc="http://schemas.openxmlformats.org/markup-compatibility/2006">
               <mc:Choice xmlns:v="urn:schemas-microsoft-com:vml" Requires="v">
-                <p:oleObj spid="_x0000_s11536" name="Visio" r:id="rId4" imgW="13496857" imgH="5267235" progId="Visio.Drawing.15">
+                <p:oleObj spid="_x0000_s11574" name="Visio" r:id="rId4" imgW="13496857" imgH="5267235" progId="Visio.Drawing.15">
                   <p:embed/>
                 </p:oleObj>
               </mc:Choice>
@@ -10357,7 +10300,7 @@
                     </p:blipFill>
                     <p:spPr>
                       <a:xfrm>
-                        <a:off x="164592" y="1920240"/>
+                        <a:off x="164592" y="1237213"/>
                         <a:ext cx="11880061" cy="4636008"/>
                       </a:xfrm>
                       <a:prstGeom prst="rect">
@@ -10371,30 +10314,6 @@
           </a:graphicData>
         </a:graphic>
       </p:graphicFrame>
-      <p:sp>
-        <p:nvSpPr>
-          <p:cNvPr id="4" name="Title 3"/>
-          <p:cNvSpPr>
-            <a:spLocks noGrp="1"/>
-          </p:cNvSpPr>
-          <p:nvPr>
-            <p:ph type="title"/>
-          </p:nvPr>
-        </p:nvSpPr>
-        <p:spPr/>
-        <p:txBody>
-          <a:bodyPr/>
-          <a:lstStyle/>
-          <a:p>
-            <a:pPr algn="ctr"/>
-            <a:r>
-              <a:rPr lang="uk-UA" dirty="0" smtClean="0"/>
-              <a:t>Схема роботи програми</a:t>
-            </a:r>
-            <a:endParaRPr lang="uk-UA" dirty="0"/>
-          </a:p>
-        </p:txBody>
-      </p:sp>
       <p:pic>
         <p:nvPicPr>
           <p:cNvPr id="6" name="Picture 5"/>
@@ -10417,7 +10336,7 @@
         </p:blipFill>
         <p:spPr>
           <a:xfrm>
-            <a:off x="-5676975" y="-182391"/>
+            <a:off x="-5676975" y="-865418"/>
             <a:ext cx="23622150" cy="8512636"/>
           </a:xfrm>
           <a:prstGeom prst="rect">
@@ -10478,20 +10397,20 @@
           <p:nvPr>
             <p:extLst>
               <p:ext uri="{D42A27DB-BD31-4B8C-83A1-F6EECF244321}">
-                <p14:modId xmlns:p14="http://schemas.microsoft.com/office/powerpoint/2010/main" val="104902973"/>
+                <p14:modId xmlns:p14="http://schemas.microsoft.com/office/powerpoint/2010/main" val="1886839324"/>
               </p:ext>
             </p:extLst>
           </p:nvPr>
         </p:nvGraphicFramePr>
         <p:xfrm>
-          <a:off x="164592" y="1920240"/>
+          <a:off x="164592" y="1237213"/>
           <a:ext cx="11880061" cy="4636008"/>
         </p:xfrm>
         <a:graphic>
           <a:graphicData uri="http://schemas.openxmlformats.org/presentationml/2006/ole">
             <mc:AlternateContent xmlns:mc="http://schemas.openxmlformats.org/markup-compatibility/2006">
               <mc:Choice xmlns:v="urn:schemas-microsoft-com:vml" Requires="v">
-                <p:oleObj spid="_x0000_s12554" name="Visio" r:id="rId4" imgW="13496857" imgH="5267235" progId="Visio.Drawing.15">
+                <p:oleObj spid="_x0000_s12592" name="Visio" r:id="rId4" imgW="13496857" imgH="5267235" progId="Visio.Drawing.15">
                   <p:embed/>
                 </p:oleObj>
               </mc:Choice>
@@ -10512,7 +10431,7 @@
                     </p:blipFill>
                     <p:spPr>
                       <a:xfrm>
-                        <a:off x="164592" y="1920240"/>
+                        <a:off x="164592" y="1237213"/>
                         <a:ext cx="11880061" cy="4636008"/>
                       </a:xfrm>
                       <a:prstGeom prst="rect">
@@ -10526,30 +10445,6 @@
           </a:graphicData>
         </a:graphic>
       </p:graphicFrame>
-      <p:sp>
-        <p:nvSpPr>
-          <p:cNvPr id="4" name="Title 3"/>
-          <p:cNvSpPr>
-            <a:spLocks noGrp="1"/>
-          </p:cNvSpPr>
-          <p:nvPr>
-            <p:ph type="title"/>
-          </p:nvPr>
-        </p:nvSpPr>
-        <p:spPr/>
-        <p:txBody>
-          <a:bodyPr/>
-          <a:lstStyle/>
-          <a:p>
-            <a:pPr algn="ctr"/>
-            <a:r>
-              <a:rPr lang="uk-UA" dirty="0" smtClean="0"/>
-              <a:t>Схема роботи програми</a:t>
-            </a:r>
-            <a:endParaRPr lang="uk-UA" dirty="0"/>
-          </a:p>
-        </p:txBody>
-      </p:sp>
       <p:pic>
         <p:nvPicPr>
           <p:cNvPr id="6" name="Picture 5"/>
@@ -10572,7 +10467,7 @@
         </p:blipFill>
         <p:spPr>
           <a:xfrm>
-            <a:off x="-5676974" y="-182391"/>
+            <a:off x="-5676974" y="-865418"/>
             <a:ext cx="23622147" cy="8512636"/>
           </a:xfrm>
           <a:prstGeom prst="rect">
@@ -10704,246 +10599,404 @@
           <a:chExt cx="0" cy="0"/>
         </a:xfrm>
       </p:grpSpPr>
-      <p:grpSp>
-        <p:nvGrpSpPr>
-          <p:cNvPr id="12" name="Group 11"/>
-          <p:cNvGrpSpPr/>
+      <p:pic>
+        <p:nvPicPr>
+          <p:cNvPr id="4" name="Picture 3"/>
+          <p:cNvPicPr>
+            <a:picLocks noChangeAspect="1"/>
+          </p:cNvPicPr>
           <p:nvPr/>
-        </p:nvGrpSpPr>
-        <p:grpSpPr>
+        </p:nvPicPr>
+        <p:blipFill>
+          <a:blip r:embed="rId3" cstate="print">
+            <a:extLst>
+              <a:ext uri="{28A0092B-C50C-407E-A947-70E740481C1C}">
+                <a14:useLocalDpi xmlns:a14="http://schemas.microsoft.com/office/drawing/2010/main" val="0"/>
+              </a:ext>
+            </a:extLst>
+          </a:blip>
+          <a:stretch>
+            <a:fillRect/>
+          </a:stretch>
+        </p:blipFill>
+        <p:spPr>
           <a:xfrm>
-            <a:off x="494383" y="3655846"/>
-            <a:ext cx="11203234" cy="3014683"/>
-            <a:chOff x="722066" y="3541546"/>
-            <a:chExt cx="11203234" cy="3014683"/>
+            <a:off x="8455644" y="4165767"/>
+            <a:ext cx="2629473" cy="2336379"/>
           </a:xfrm>
-        </p:grpSpPr>
-        <p:pic>
-          <p:nvPicPr>
-            <p:cNvPr id="4" name="Picture 3"/>
-            <p:cNvPicPr>
-              <a:picLocks noChangeAspect="1"/>
-            </p:cNvPicPr>
-            <p:nvPr/>
-          </p:nvPicPr>
-          <p:blipFill>
-            <a:blip r:embed="rId3" cstate="print">
-              <a:extLst>
-                <a:ext uri="{28A0092B-C50C-407E-A947-70E740481C1C}">
-                  <a14:useLocalDpi xmlns:a14="http://schemas.microsoft.com/office/drawing/2010/main" val="0"/>
-                </a:ext>
-              </a:extLst>
-            </a:blip>
-            <a:stretch>
-              <a:fillRect/>
-            </a:stretch>
-          </p:blipFill>
-          <p:spPr>
-            <a:xfrm>
-              <a:off x="6519173" y="3853642"/>
-              <a:ext cx="2629473" cy="2336379"/>
-            </a:xfrm>
-            <a:prstGeom prst="rect">
-              <a:avLst/>
-            </a:prstGeom>
-          </p:spPr>
-        </p:pic>
-        <p:pic>
-          <p:nvPicPr>
-            <p:cNvPr id="5" name="Picture 4"/>
-            <p:cNvPicPr>
-              <a:picLocks noChangeAspect="1"/>
-            </p:cNvPicPr>
-            <p:nvPr/>
-          </p:nvPicPr>
-          <p:blipFill>
-            <a:blip r:embed="rId4" cstate="print">
-              <a:extLst>
-                <a:ext uri="{28A0092B-C50C-407E-A947-70E740481C1C}">
-                  <a14:useLocalDpi xmlns:a14="http://schemas.microsoft.com/office/drawing/2010/main" val="0"/>
-                </a:ext>
-              </a:extLst>
-            </a:blip>
-            <a:stretch>
-              <a:fillRect/>
-            </a:stretch>
-          </p:blipFill>
-          <p:spPr>
-            <a:xfrm>
-              <a:off x="9417727" y="3541546"/>
-              <a:ext cx="2507573" cy="3014683"/>
-            </a:xfrm>
-            <a:prstGeom prst="rect">
-              <a:avLst/>
-            </a:prstGeom>
-          </p:spPr>
-        </p:pic>
-        <p:pic>
-          <p:nvPicPr>
-            <p:cNvPr id="6" name="Picture 5"/>
-            <p:cNvPicPr>
-              <a:picLocks noChangeAspect="1"/>
-            </p:cNvPicPr>
-            <p:nvPr/>
-          </p:nvPicPr>
-          <p:blipFill>
-            <a:blip r:embed="rId5" cstate="print">
-              <a:extLst>
-                <a:ext uri="{28A0092B-C50C-407E-A947-70E740481C1C}">
-                  <a14:useLocalDpi xmlns:a14="http://schemas.microsoft.com/office/drawing/2010/main" val="0"/>
-                </a:ext>
-              </a:extLst>
-            </a:blip>
-            <a:stretch>
-              <a:fillRect/>
-            </a:stretch>
-          </p:blipFill>
-          <p:spPr>
-            <a:xfrm>
-              <a:off x="722066" y="3734197"/>
-              <a:ext cx="3186352" cy="2595977"/>
-            </a:xfrm>
-            <a:prstGeom prst="rect">
-              <a:avLst/>
-            </a:prstGeom>
-          </p:spPr>
-        </p:pic>
-        <p:pic>
-          <p:nvPicPr>
-            <p:cNvPr id="7" name="Picture 6"/>
-            <p:cNvPicPr>
-              <a:picLocks noChangeAspect="1"/>
-            </p:cNvPicPr>
-            <p:nvPr/>
-          </p:nvPicPr>
-          <p:blipFill>
-            <a:blip r:embed="rId6" cstate="print">
-              <a:extLst>
-                <a:ext uri="{28A0092B-C50C-407E-A947-70E740481C1C}">
-                  <a14:useLocalDpi xmlns:a14="http://schemas.microsoft.com/office/drawing/2010/main" val="0"/>
-                </a:ext>
-              </a:extLst>
-            </a:blip>
-            <a:stretch>
-              <a:fillRect/>
-            </a:stretch>
-          </p:blipFill>
-          <p:spPr>
-            <a:xfrm>
-              <a:off x="4133071" y="3853642"/>
-              <a:ext cx="2072594" cy="2336379"/>
-            </a:xfrm>
-            <a:prstGeom prst="rect">
-              <a:avLst/>
-            </a:prstGeom>
-          </p:spPr>
-        </p:pic>
-      </p:grpSp>
-      <p:grpSp>
-        <p:nvGrpSpPr>
-          <p:cNvPr id="11" name="Group 10"/>
-          <p:cNvGrpSpPr/>
+          <a:prstGeom prst="rect">
+            <a:avLst/>
+          </a:prstGeom>
+        </p:spPr>
+      </p:pic>
+      <p:pic>
+        <p:nvPicPr>
+          <p:cNvPr id="6" name="Picture 5"/>
+          <p:cNvPicPr>
+            <a:picLocks noChangeAspect="1"/>
+          </p:cNvPicPr>
           <p:nvPr/>
-        </p:nvGrpSpPr>
-        <p:grpSpPr>
+        </p:nvPicPr>
+        <p:blipFill>
+          <a:blip r:embed="rId4" cstate="print">
+            <a:extLst>
+              <a:ext uri="{28A0092B-C50C-407E-A947-70E740481C1C}">
+                <a14:useLocalDpi xmlns:a14="http://schemas.microsoft.com/office/drawing/2010/main" val="0"/>
+              </a:ext>
+            </a:extLst>
+          </a:blip>
+          <a:stretch>
+            <a:fillRect/>
+          </a:stretch>
+        </p:blipFill>
+        <p:spPr>
           <a:xfrm>
-            <a:off x="885062" y="229939"/>
-            <a:ext cx="10421876" cy="3033961"/>
-            <a:chOff x="1224023" y="507585"/>
-            <a:chExt cx="10421876" cy="3033961"/>
+            <a:off x="494383" y="4035968"/>
+            <a:ext cx="3186352" cy="2595977"/>
           </a:xfrm>
-        </p:grpSpPr>
-        <p:pic>
-          <p:nvPicPr>
-            <p:cNvPr id="8" name="Picture 7"/>
-            <p:cNvPicPr>
-              <a:picLocks noChangeAspect="1"/>
-            </p:cNvPicPr>
-            <p:nvPr/>
-          </p:nvPicPr>
-          <p:blipFill>
-            <a:blip r:embed="rId7" cstate="print">
-              <a:extLst>
-                <a:ext uri="{28A0092B-C50C-407E-A947-70E740481C1C}">
-                  <a14:useLocalDpi xmlns:a14="http://schemas.microsoft.com/office/drawing/2010/main" val="0"/>
-                </a:ext>
-              </a:extLst>
-            </a:blip>
-            <a:stretch>
-              <a:fillRect/>
-            </a:stretch>
-          </p:blipFill>
-          <p:spPr>
-            <a:xfrm>
-              <a:off x="8572790" y="507585"/>
-              <a:ext cx="3073109" cy="3033961"/>
-            </a:xfrm>
-            <a:prstGeom prst="rect">
-              <a:avLst/>
-            </a:prstGeom>
-          </p:spPr>
-        </p:pic>
-        <p:pic>
-          <p:nvPicPr>
-            <p:cNvPr id="9" name="Picture 8"/>
-            <p:cNvPicPr>
-              <a:picLocks noChangeAspect="1"/>
-            </p:cNvPicPr>
-            <p:nvPr/>
-          </p:nvPicPr>
-          <p:blipFill>
-            <a:blip r:embed="rId8" cstate="print">
-              <a:extLst>
-                <a:ext uri="{28A0092B-C50C-407E-A947-70E740481C1C}">
-                  <a14:useLocalDpi xmlns:a14="http://schemas.microsoft.com/office/drawing/2010/main" val="0"/>
-                </a:ext>
-              </a:extLst>
-            </a:blip>
-            <a:stretch>
-              <a:fillRect/>
-            </a:stretch>
-          </p:blipFill>
-          <p:spPr>
-            <a:xfrm>
-              <a:off x="5241325" y="627030"/>
-              <a:ext cx="1771442" cy="2730565"/>
-            </a:xfrm>
-            <a:prstGeom prst="rect">
-              <a:avLst/>
-            </a:prstGeom>
-          </p:spPr>
-        </p:pic>
-        <p:pic>
-          <p:nvPicPr>
-            <p:cNvPr id="10" name="Picture 9"/>
-            <p:cNvPicPr>
-              <a:picLocks noChangeAspect="1"/>
-            </p:cNvPicPr>
-            <p:nvPr/>
-          </p:nvPicPr>
-          <p:blipFill>
-            <a:blip r:embed="rId9" cstate="print">
-              <a:extLst>
-                <a:ext uri="{28A0092B-C50C-407E-A947-70E740481C1C}">
-                  <a14:useLocalDpi xmlns:a14="http://schemas.microsoft.com/office/drawing/2010/main" val="0"/>
-                </a:ext>
-              </a:extLst>
-            </a:blip>
-            <a:stretch>
-              <a:fillRect/>
-            </a:stretch>
-          </p:blipFill>
-          <p:spPr>
-            <a:xfrm>
-              <a:off x="1224023" y="627030"/>
-              <a:ext cx="2642483" cy="2730565"/>
-            </a:xfrm>
-            <a:prstGeom prst="rect">
-              <a:avLst/>
-            </a:prstGeom>
-          </p:spPr>
-        </p:pic>
-      </p:grpSp>
+          <a:prstGeom prst="rect">
+            <a:avLst/>
+          </a:prstGeom>
+        </p:spPr>
+      </p:pic>
+      <p:pic>
+        <p:nvPicPr>
+          <p:cNvPr id="7" name="Picture 6"/>
+          <p:cNvPicPr>
+            <a:picLocks noChangeAspect="1"/>
+          </p:cNvPicPr>
+          <p:nvPr/>
+        </p:nvPicPr>
+        <p:blipFill>
+          <a:blip r:embed="rId5" cstate="print">
+            <a:extLst>
+              <a:ext uri="{28A0092B-C50C-407E-A947-70E740481C1C}">
+                <a14:useLocalDpi xmlns:a14="http://schemas.microsoft.com/office/drawing/2010/main" val="0"/>
+              </a:ext>
+            </a:extLst>
+          </a:blip>
+          <a:stretch>
+            <a:fillRect/>
+          </a:stretch>
+        </p:blipFill>
+        <p:spPr>
+          <a:xfrm>
+            <a:off x="5031893" y="4165767"/>
+            <a:ext cx="2072594" cy="2336379"/>
+          </a:xfrm>
+          <a:prstGeom prst="rect">
+            <a:avLst/>
+          </a:prstGeom>
+        </p:spPr>
+      </p:pic>
+      <p:pic>
+        <p:nvPicPr>
+          <p:cNvPr id="8" name="Picture 7"/>
+          <p:cNvPicPr>
+            <a:picLocks noChangeAspect="1"/>
+          </p:cNvPicPr>
+          <p:nvPr/>
+        </p:nvPicPr>
+        <p:blipFill>
+          <a:blip r:embed="rId6" cstate="print">
+            <a:extLst>
+              <a:ext uri="{28A0092B-C50C-407E-A947-70E740481C1C}">
+                <a14:useLocalDpi xmlns:a14="http://schemas.microsoft.com/office/drawing/2010/main" val="0"/>
+              </a:ext>
+            </a:extLst>
+          </a:blip>
+          <a:stretch>
+            <a:fillRect/>
+          </a:stretch>
+        </p:blipFill>
+        <p:spPr>
+          <a:xfrm>
+            <a:off x="8422824" y="186587"/>
+            <a:ext cx="2695120" cy="2660788"/>
+          </a:xfrm>
+          <a:prstGeom prst="rect">
+            <a:avLst/>
+          </a:prstGeom>
+        </p:spPr>
+      </p:pic>
+      <p:pic>
+        <p:nvPicPr>
+          <p:cNvPr id="9" name="Picture 8"/>
+          <p:cNvPicPr>
+            <a:picLocks noChangeAspect="1"/>
+          </p:cNvPicPr>
+          <p:nvPr/>
+        </p:nvPicPr>
+        <p:blipFill>
+          <a:blip r:embed="rId7" cstate="print">
+            <a:extLst>
+              <a:ext uri="{28A0092B-C50C-407E-A947-70E740481C1C}">
+                <a14:useLocalDpi xmlns:a14="http://schemas.microsoft.com/office/drawing/2010/main" val="0"/>
+              </a:ext>
+            </a:extLst>
+          </a:blip>
+          <a:stretch>
+            <a:fillRect/>
+          </a:stretch>
+        </p:blipFill>
+        <p:spPr>
+          <a:xfrm>
+            <a:off x="5117151" y="319627"/>
+            <a:ext cx="1553556" cy="2394708"/>
+          </a:xfrm>
+          <a:prstGeom prst="rect">
+            <a:avLst/>
+          </a:prstGeom>
+        </p:spPr>
+      </p:pic>
+      <p:pic>
+        <p:nvPicPr>
+          <p:cNvPr id="10" name="Picture 9"/>
+          <p:cNvPicPr>
+            <a:picLocks noChangeAspect="1"/>
+          </p:cNvPicPr>
+          <p:nvPr/>
+        </p:nvPicPr>
+        <p:blipFill>
+          <a:blip r:embed="rId8" cstate="print">
+            <a:extLst>
+              <a:ext uri="{28A0092B-C50C-407E-A947-70E740481C1C}">
+                <a14:useLocalDpi xmlns:a14="http://schemas.microsoft.com/office/drawing/2010/main" val="0"/>
+              </a:ext>
+            </a:extLst>
+          </a:blip>
+          <a:stretch>
+            <a:fillRect/>
+          </a:stretch>
+        </p:blipFill>
+        <p:spPr>
+          <a:xfrm>
+            <a:off x="1047574" y="319627"/>
+            <a:ext cx="2317460" cy="2394708"/>
+          </a:xfrm>
+          <a:prstGeom prst="rect">
+            <a:avLst/>
+          </a:prstGeom>
+        </p:spPr>
+      </p:pic>
+      <p:sp>
+        <p:nvSpPr>
+          <p:cNvPr id="13" name="TextBox 12"/>
+          <p:cNvSpPr txBox="1"/>
+          <p:nvPr/>
+        </p:nvSpPr>
+        <p:spPr>
+          <a:xfrm>
+            <a:off x="5124899" y="2847375"/>
+            <a:ext cx="1726884" cy="461665"/>
+          </a:xfrm>
+          <a:prstGeom prst="rect">
+            <a:avLst/>
+          </a:prstGeom>
+          <a:noFill/>
+        </p:spPr>
+        <p:txBody>
+          <a:bodyPr wrap="none" rtlCol="0" anchor="ctr">
+            <a:spAutoFit/>
+          </a:bodyPr>
+          <a:lstStyle/>
+          <a:p>
+            <a:pPr algn="ctr"/>
+            <a:r>
+              <a:rPr lang="en-US" sz="2400" dirty="0"/>
+              <a:t>Pololu </a:t>
+            </a:r>
+            <a:r>
+              <a:rPr lang="en-US" sz="2400" dirty="0" smtClean="0"/>
+              <a:t>Wixel</a:t>
+            </a:r>
+            <a:endParaRPr lang="ru-RU" sz="2400" dirty="0"/>
+          </a:p>
+        </p:txBody>
+      </p:sp>
+      <p:sp>
+        <p:nvSpPr>
+          <p:cNvPr id="14" name="TextBox 13"/>
+          <p:cNvSpPr txBox="1"/>
+          <p:nvPr/>
+        </p:nvSpPr>
+        <p:spPr>
+          <a:xfrm>
+            <a:off x="586563" y="2847375"/>
+            <a:ext cx="3239477" cy="461665"/>
+          </a:xfrm>
+          <a:prstGeom prst="rect">
+            <a:avLst/>
+          </a:prstGeom>
+          <a:noFill/>
+        </p:spPr>
+        <p:txBody>
+          <a:bodyPr wrap="none" rtlCol="0" anchor="ctr">
+            <a:spAutoFit/>
+          </a:bodyPr>
+          <a:lstStyle/>
+          <a:p>
+            <a:pPr algn="ctr"/>
+            <a:r>
+              <a:rPr lang="en-US" sz="2400" dirty="0" smtClean="0"/>
+              <a:t>MetaGeek </a:t>
+            </a:r>
+            <a:r>
+              <a:rPr lang="en-US" sz="2400" dirty="0"/>
+              <a:t>Wi-Spy Gen 1</a:t>
+            </a:r>
+            <a:endParaRPr lang="ru-RU" sz="2400" dirty="0"/>
+          </a:p>
+        </p:txBody>
+      </p:sp>
+      <p:sp>
+        <p:nvSpPr>
+          <p:cNvPr id="15" name="TextBox 14"/>
+          <p:cNvSpPr txBox="1"/>
+          <p:nvPr/>
+        </p:nvSpPr>
+        <p:spPr>
+          <a:xfrm>
+            <a:off x="7638452" y="2847375"/>
+            <a:ext cx="4263860" cy="461665"/>
+          </a:xfrm>
+          <a:prstGeom prst="rect">
+            <a:avLst/>
+          </a:prstGeom>
+          <a:noFill/>
+        </p:spPr>
+        <p:txBody>
+          <a:bodyPr wrap="none" rtlCol="0" anchor="ctr">
+            <a:spAutoFit/>
+          </a:bodyPr>
+          <a:lstStyle/>
+          <a:p>
+            <a:pPr algn="ctr"/>
+            <a:r>
+              <a:rPr lang="nl-NL" sz="2400" dirty="0" smtClean="0"/>
+              <a:t>Unigen </a:t>
+            </a:r>
+            <a:r>
+              <a:rPr lang="nl-NL" sz="2400" dirty="0"/>
+              <a:t>ISM Sniffer (Wi-detector)</a:t>
+            </a:r>
+            <a:endParaRPr lang="ru-RU" sz="2400" dirty="0"/>
+          </a:p>
+        </p:txBody>
+      </p:sp>
+      <p:sp>
+        <p:nvSpPr>
+          <p:cNvPr id="23" name="TextBox 22"/>
+          <p:cNvSpPr txBox="1"/>
+          <p:nvPr/>
+        </p:nvSpPr>
+        <p:spPr>
+          <a:xfrm>
+            <a:off x="4798689" y="3566571"/>
+            <a:ext cx="2379306" cy="461665"/>
+          </a:xfrm>
+          <a:prstGeom prst="rect">
+            <a:avLst/>
+          </a:prstGeom>
+          <a:noFill/>
+        </p:spPr>
+        <p:txBody>
+          <a:bodyPr wrap="none" rtlCol="0" anchor="ctr">
+            <a:spAutoFit/>
+          </a:bodyPr>
+          <a:lstStyle/>
+          <a:p>
+            <a:pPr algn="ctr"/>
+            <a:r>
+              <a:rPr lang="en-US" sz="2400" dirty="0" smtClean="0"/>
+              <a:t>Ubiquiti </a:t>
+            </a:r>
+            <a:r>
+              <a:rPr lang="en-US" sz="2400" dirty="0" err="1"/>
+              <a:t>AirView2</a:t>
+            </a:r>
+            <a:endParaRPr lang="ru-RU" sz="2400" dirty="0"/>
+          </a:p>
+        </p:txBody>
+      </p:sp>
+      <p:sp>
+        <p:nvSpPr>
+          <p:cNvPr id="24" name="TextBox 23"/>
+          <p:cNvSpPr txBox="1"/>
+          <p:nvPr/>
+        </p:nvSpPr>
+        <p:spPr>
+          <a:xfrm>
+            <a:off x="2270" y="3566571"/>
+            <a:ext cx="4408066" cy="461665"/>
+          </a:xfrm>
+          <a:prstGeom prst="rect">
+            <a:avLst/>
+          </a:prstGeom>
+          <a:noFill/>
+        </p:spPr>
+        <p:txBody>
+          <a:bodyPr wrap="none" rtlCol="0" anchor="ctr">
+            <a:spAutoFit/>
+          </a:bodyPr>
+          <a:lstStyle/>
+          <a:p>
+            <a:pPr algn="ctr"/>
+            <a:r>
+              <a:rPr lang="en-US" sz="2400" dirty="0" smtClean="0"/>
+              <a:t>Texas </a:t>
+            </a:r>
+            <a:r>
+              <a:rPr lang="en-US" sz="2400" dirty="0"/>
+              <a:t>Instruments </a:t>
+            </a:r>
+            <a:r>
+              <a:rPr lang="en-US" sz="2400" dirty="0" err="1"/>
+              <a:t>ez430-RF2500</a:t>
+            </a:r>
+            <a:endParaRPr lang="ru-RU" sz="2400" dirty="0"/>
+          </a:p>
+        </p:txBody>
+      </p:sp>
+      <p:sp>
+        <p:nvSpPr>
+          <p:cNvPr id="25" name="TextBox 24"/>
+          <p:cNvSpPr txBox="1"/>
+          <p:nvPr/>
+        </p:nvSpPr>
+        <p:spPr>
+          <a:xfrm>
+            <a:off x="8257242" y="3566571"/>
+            <a:ext cx="3026278" cy="461665"/>
+          </a:xfrm>
+          <a:prstGeom prst="rect">
+            <a:avLst/>
+          </a:prstGeom>
+          <a:noFill/>
+        </p:spPr>
+        <p:txBody>
+          <a:bodyPr wrap="none" rtlCol="0" anchor="ctr">
+            <a:spAutoFit/>
+          </a:bodyPr>
+          <a:lstStyle/>
+          <a:p>
+            <a:pPr algn="ctr"/>
+            <a:r>
+              <a:rPr lang="en-US" sz="2400" dirty="0" smtClean="0"/>
+              <a:t>MetaGeek </a:t>
+            </a:r>
+            <a:r>
+              <a:rPr lang="en-US" sz="2400" dirty="0"/>
+              <a:t>Wi-Spy </a:t>
+            </a:r>
+            <a:r>
+              <a:rPr lang="en-US" sz="2400" dirty="0" err="1"/>
+              <a:t>2.4x</a:t>
+            </a:r>
+            <a:endParaRPr lang="ru-RU" sz="2400" dirty="0"/>
+          </a:p>
+        </p:txBody>
+      </p:sp>
     </p:spTree>
     <p:extLst>
       <p:ext uri="{BB962C8B-B14F-4D97-AF65-F5344CB8AC3E}">
@@ -11002,20 +11055,20 @@
           <p:nvPr>
             <p:extLst>
               <p:ext uri="{D42A27DB-BD31-4B8C-83A1-F6EECF244321}">
-                <p14:modId xmlns:p14="http://schemas.microsoft.com/office/powerpoint/2010/main" val="3419790132"/>
+                <p14:modId xmlns:p14="http://schemas.microsoft.com/office/powerpoint/2010/main" val="223184126"/>
               </p:ext>
             </p:extLst>
           </p:nvPr>
         </p:nvGraphicFramePr>
         <p:xfrm>
-          <a:off x="164592" y="1920240"/>
+          <a:off x="164592" y="1222924"/>
           <a:ext cx="11880061" cy="4636008"/>
         </p:xfrm>
         <a:graphic>
           <a:graphicData uri="http://schemas.openxmlformats.org/presentationml/2006/ole">
             <mc:AlternateContent xmlns:mc="http://schemas.openxmlformats.org/markup-compatibility/2006">
               <mc:Choice xmlns:v="urn:schemas-microsoft-com:vml" Requires="v">
-                <p:oleObj spid="_x0000_s13407" name="Visio" r:id="rId4" imgW="13496857" imgH="5267235" progId="Visio.Drawing.15">
+                <p:oleObj spid="_x0000_s13445" name="Visio" r:id="rId4" imgW="13496857" imgH="5267235" progId="Visio.Drawing.15">
                   <p:embed/>
                 </p:oleObj>
               </mc:Choice>
@@ -11036,7 +11089,7 @@
                     </p:blipFill>
                     <p:spPr>
                       <a:xfrm>
-                        <a:off x="164592" y="1920240"/>
+                        <a:off x="164592" y="1222924"/>
                         <a:ext cx="11880061" cy="4636008"/>
                       </a:xfrm>
                       <a:prstGeom prst="rect">
@@ -11050,30 +11103,6 @@
           </a:graphicData>
         </a:graphic>
       </p:graphicFrame>
-      <p:sp>
-        <p:nvSpPr>
-          <p:cNvPr id="4" name="Title 3"/>
-          <p:cNvSpPr>
-            <a:spLocks noGrp="1"/>
-          </p:cNvSpPr>
-          <p:nvPr>
-            <p:ph type="title"/>
-          </p:nvPr>
-        </p:nvSpPr>
-        <p:spPr/>
-        <p:txBody>
-          <a:bodyPr/>
-          <a:lstStyle/>
-          <a:p>
-            <a:pPr algn="ctr"/>
-            <a:r>
-              <a:rPr lang="uk-UA" dirty="0" smtClean="0"/>
-              <a:t>Схема роботи програми</a:t>
-            </a:r>
-            <a:endParaRPr lang="uk-UA" dirty="0"/>
-          </a:p>
-        </p:txBody>
-      </p:sp>
       <p:pic>
         <p:nvPicPr>
           <p:cNvPr id="6" name="Picture 5"/>
@@ -11096,7 +11125,7 @@
         </p:blipFill>
         <p:spPr>
           <a:xfrm>
-            <a:off x="-5781752" y="-168103"/>
+            <a:off x="-5760720" y="-865419"/>
             <a:ext cx="23622154" cy="8512638"/>
           </a:xfrm>
           <a:prstGeom prst="rect">
@@ -11242,20 +11271,20 @@
           <p:nvPr>
             <p:extLst>
               <p:ext uri="{D42A27DB-BD31-4B8C-83A1-F6EECF244321}">
-                <p14:modId xmlns:p14="http://schemas.microsoft.com/office/powerpoint/2010/main" val="2305755280"/>
+                <p14:modId xmlns:p14="http://schemas.microsoft.com/office/powerpoint/2010/main" val="808308739"/>
               </p:ext>
             </p:extLst>
           </p:nvPr>
         </p:nvGraphicFramePr>
         <p:xfrm>
-          <a:off x="164592" y="1920240"/>
+          <a:off x="164592" y="1222924"/>
           <a:ext cx="11880061" cy="4636008"/>
         </p:xfrm>
         <a:graphic>
           <a:graphicData uri="http://schemas.openxmlformats.org/presentationml/2006/ole">
             <mc:AlternateContent xmlns:mc="http://schemas.openxmlformats.org/markup-compatibility/2006">
               <mc:Choice xmlns:v="urn:schemas-microsoft-com:vml" Requires="v">
-                <p:oleObj spid="_x0000_s8468" name="Visio" r:id="rId4" imgW="13496857" imgH="5267235" progId="Visio.Drawing.15">
+                <p:oleObj spid="_x0000_s8506" name="Visio" r:id="rId4" imgW="13496857" imgH="5267235" progId="Visio.Drawing.15">
                   <p:embed/>
                 </p:oleObj>
               </mc:Choice>
@@ -11276,7 +11305,7 @@
                     </p:blipFill>
                     <p:spPr>
                       <a:xfrm>
-                        <a:off x="164592" y="1920240"/>
+                        <a:off x="164592" y="1222924"/>
                         <a:ext cx="11880061" cy="4636008"/>
                       </a:xfrm>
                       <a:prstGeom prst="rect">
@@ -11290,30 +11319,6 @@
           </a:graphicData>
         </a:graphic>
       </p:graphicFrame>
-      <p:sp>
-        <p:nvSpPr>
-          <p:cNvPr id="4" name="Title 3"/>
-          <p:cNvSpPr>
-            <a:spLocks noGrp="1"/>
-          </p:cNvSpPr>
-          <p:nvPr>
-            <p:ph type="title"/>
-          </p:nvPr>
-        </p:nvSpPr>
-        <p:spPr/>
-        <p:txBody>
-          <a:bodyPr/>
-          <a:lstStyle/>
-          <a:p>
-            <a:pPr algn="ctr"/>
-            <a:r>
-              <a:rPr lang="uk-UA" dirty="0" smtClean="0"/>
-              <a:t>Схема роботи програми</a:t>
-            </a:r>
-            <a:endParaRPr lang="uk-UA" dirty="0"/>
-          </a:p>
-        </p:txBody>
-      </p:sp>
       <p:pic>
         <p:nvPicPr>
           <p:cNvPr id="6" name="Picture 5"/>
@@ -11336,7 +11341,7 @@
         </p:blipFill>
         <p:spPr>
           <a:xfrm>
-            <a:off x="-5761431" y="-168103"/>
+            <a:off x="-5761431" y="-865419"/>
             <a:ext cx="23622152" cy="8512637"/>
           </a:xfrm>
           <a:prstGeom prst="rect">
@@ -11397,20 +11402,20 @@
           <p:nvPr>
             <p:extLst>
               <p:ext uri="{D42A27DB-BD31-4B8C-83A1-F6EECF244321}">
-                <p14:modId xmlns:p14="http://schemas.microsoft.com/office/powerpoint/2010/main" val="2305755280"/>
+                <p14:modId xmlns:p14="http://schemas.microsoft.com/office/powerpoint/2010/main" val="4114190989"/>
               </p:ext>
             </p:extLst>
           </p:nvPr>
         </p:nvGraphicFramePr>
         <p:xfrm>
-          <a:off x="164592" y="1920240"/>
+          <a:off x="164592" y="1222924"/>
           <a:ext cx="11880061" cy="4636008"/>
         </p:xfrm>
         <a:graphic>
           <a:graphicData uri="http://schemas.openxmlformats.org/presentationml/2006/ole">
             <mc:AlternateContent xmlns:mc="http://schemas.openxmlformats.org/markup-compatibility/2006">
               <mc:Choice xmlns:v="urn:schemas-microsoft-com:vml" Requires="v">
-                <p:oleObj spid="_x0000_s14430" name="Visio" r:id="rId4" imgW="13496857" imgH="5267235" progId="Visio.Drawing.15">
+                <p:oleObj spid="_x0000_s14468" name="Visio" r:id="rId4" imgW="13496857" imgH="5267235" progId="Visio.Drawing.15">
                   <p:embed/>
                 </p:oleObj>
               </mc:Choice>
@@ -11431,7 +11436,7 @@
                     </p:blipFill>
                     <p:spPr>
                       <a:xfrm>
-                        <a:off x="164592" y="1920240"/>
+                        <a:off x="164592" y="1222924"/>
                         <a:ext cx="11880061" cy="4636008"/>
                       </a:xfrm>
                       <a:prstGeom prst="rect">
@@ -11445,30 +11450,6 @@
           </a:graphicData>
         </a:graphic>
       </p:graphicFrame>
-      <p:sp>
-        <p:nvSpPr>
-          <p:cNvPr id="4" name="Title 3"/>
-          <p:cNvSpPr>
-            <a:spLocks noGrp="1"/>
-          </p:cNvSpPr>
-          <p:nvPr>
-            <p:ph type="title"/>
-          </p:nvPr>
-        </p:nvSpPr>
-        <p:spPr/>
-        <p:txBody>
-          <a:bodyPr/>
-          <a:lstStyle/>
-          <a:p>
-            <a:pPr algn="ctr"/>
-            <a:r>
-              <a:rPr lang="uk-UA" dirty="0" smtClean="0"/>
-              <a:t>Схема роботи програми</a:t>
-            </a:r>
-            <a:endParaRPr lang="uk-UA" dirty="0"/>
-          </a:p>
-        </p:txBody>
-      </p:sp>
       <p:pic>
         <p:nvPicPr>
           <p:cNvPr id="6" name="Picture 5"/>
@@ -11491,7 +11472,7 @@
         </p:blipFill>
         <p:spPr>
           <a:xfrm>
-            <a:off x="-5727775" y="-168103"/>
+            <a:off x="-5727775" y="-865419"/>
             <a:ext cx="23622150" cy="8512637"/>
           </a:xfrm>
           <a:prstGeom prst="rect">
@@ -13046,20 +13027,20 @@
           <p:nvPr>
             <p:extLst>
               <p:ext uri="{D42A27DB-BD31-4B8C-83A1-F6EECF244321}">
-                <p14:modId xmlns:p14="http://schemas.microsoft.com/office/powerpoint/2010/main" val="2714844389"/>
+                <p14:modId xmlns:p14="http://schemas.microsoft.com/office/powerpoint/2010/main" val="2759436523"/>
               </p:ext>
             </p:extLst>
           </p:nvPr>
         </p:nvGraphicFramePr>
         <p:xfrm>
-          <a:off x="164592" y="1920240"/>
+          <a:off x="164592" y="1226099"/>
           <a:ext cx="11880061" cy="4636008"/>
         </p:xfrm>
         <a:graphic>
           <a:graphicData uri="http://schemas.openxmlformats.org/presentationml/2006/ole">
             <mc:AlternateContent xmlns:mc="http://schemas.openxmlformats.org/markup-compatibility/2006">
               <mc:Choice xmlns:v="urn:schemas-microsoft-com:vml" Requires="v">
-                <p:oleObj spid="_x0000_s6456" name="Visio" r:id="rId4" imgW="13496857" imgH="5267235" progId="Visio.Drawing.15">
+                <p:oleObj spid="_x0000_s6494" name="Visio" r:id="rId4" imgW="13496857" imgH="5267235" progId="Visio.Drawing.15">
                   <p:embed/>
                 </p:oleObj>
               </mc:Choice>
@@ -13080,7 +13061,7 @@
                     </p:blipFill>
                     <p:spPr>
                       <a:xfrm>
-                        <a:off x="164592" y="1920240"/>
+                        <a:off x="164592" y="1226099"/>
                         <a:ext cx="11880061" cy="4636008"/>
                       </a:xfrm>
                       <a:prstGeom prst="rect">
@@ -13094,30 +13075,6 @@
           </a:graphicData>
         </a:graphic>
       </p:graphicFrame>
-      <p:sp>
-        <p:nvSpPr>
-          <p:cNvPr id="4" name="Title 3"/>
-          <p:cNvSpPr>
-            <a:spLocks noGrp="1"/>
-          </p:cNvSpPr>
-          <p:nvPr>
-            <p:ph type="title"/>
-          </p:nvPr>
-        </p:nvSpPr>
-        <p:spPr/>
-        <p:txBody>
-          <a:bodyPr/>
-          <a:lstStyle/>
-          <a:p>
-            <a:pPr algn="ctr"/>
-            <a:r>
-              <a:rPr lang="uk-UA" dirty="0" smtClean="0"/>
-              <a:t>Схема роботи програми</a:t>
-            </a:r>
-            <a:endParaRPr lang="uk-UA" dirty="0"/>
-          </a:p>
-        </p:txBody>
-      </p:sp>
       <p:pic>
         <p:nvPicPr>
           <p:cNvPr id="6" name="Picture 5"/>
@@ -13140,7 +13097,7 @@
         </p:blipFill>
         <p:spPr>
           <a:xfrm>
-            <a:off x="-5699311" y="-171279"/>
+            <a:off x="-5699311" y="-865420"/>
             <a:ext cx="23622154" cy="8512640"/>
           </a:xfrm>
           <a:prstGeom prst="rect">
@@ -13654,7 +13611,7 @@
           <a:graphicData uri="http://schemas.openxmlformats.org/presentationml/2006/ole">
             <mc:AlternateContent xmlns:mc="http://schemas.openxmlformats.org/markup-compatibility/2006">
               <mc:Choice xmlns:v="urn:schemas-microsoft-com:vml" Requires="v">
-                <p:oleObj spid="_x0000_s17419" name="Visio" r:id="rId4" imgW="12039600" imgH="10124985" progId="Visio.Drawing.15">
+                <p:oleObj spid="_x0000_s17571" name="Visio" r:id="rId4" imgW="12039600" imgH="10124985" progId="Visio.Drawing.15">
                   <p:embed/>
                 </p:oleObj>
               </mc:Choice>
@@ -14298,7 +14255,7 @@
           <a:graphicData uri="http://schemas.openxmlformats.org/presentationml/2006/ole">
             <mc:AlternateContent xmlns:mc="http://schemas.openxmlformats.org/markup-compatibility/2006">
               <mc:Choice xmlns:v="urn:schemas-microsoft-com:vml" Requires="v">
-                <p:oleObj spid="_x0000_s17420" name="Visio" r:id="rId10" imgW="12039600" imgH="10124985" progId="Visio.Drawing.15">
+                <p:oleObj spid="_x0000_s17572" name="Visio" r:id="rId10" imgW="12039600" imgH="10124985" progId="Visio.Drawing.15">
                   <p:embed/>
                 </p:oleObj>
               </mc:Choice>
@@ -14365,7 +14322,7 @@
           <a:graphicData uri="http://schemas.openxmlformats.org/presentationml/2006/ole">
             <mc:AlternateContent xmlns:mc="http://schemas.openxmlformats.org/markup-compatibility/2006">
               <mc:Choice xmlns:v="urn:schemas-microsoft-com:vml" Requires="v">
-                <p:oleObj spid="_x0000_s17421" name="Visio" r:id="rId12" imgW="12039600" imgH="10124985" progId="Visio.Drawing.15">
+                <p:oleObj spid="_x0000_s17573" name="Visio" r:id="rId12" imgW="12039600" imgH="10124985" progId="Visio.Drawing.15">
                   <p:embed/>
                 </p:oleObj>
               </mc:Choice>
@@ -14426,7 +14383,7 @@
           <a:graphicData uri="http://schemas.openxmlformats.org/presentationml/2006/ole">
             <mc:AlternateContent xmlns:mc="http://schemas.openxmlformats.org/markup-compatibility/2006">
               <mc:Choice xmlns:v="urn:schemas-microsoft-com:vml" Requires="v">
-                <p:oleObj spid="_x0000_s17422" name="Visio" r:id="rId14" imgW="12039600" imgH="10124985" progId="Visio.Drawing.15">
+                <p:oleObj spid="_x0000_s17574" name="Visio" r:id="rId14" imgW="12039600" imgH="10124985" progId="Visio.Drawing.15">
                   <p:embed/>
                 </p:oleObj>
               </mc:Choice>

</xml_diff>